<commit_message>
Little changes to the poster
</commit_message>
<xml_diff>
--- a/misc/poster/poster.pptx
+++ b/misc/poster/poster.pptx
@@ -55,7 +55,7 @@
           <a:bodyPr bIns="0" lIns="0" rIns="0" tIns="0" wrap="none"/>
           <a:p>
             <a:r>
-              <a:rPr lang="de-CH"/>
+              <a:rPr lang="en-US"/>
               <a:t>Click to edit the notes format</a:t>
             </a:r>
             <a:endParaRPr/>
@@ -85,7 +85,7 @@
           <a:bodyPr bIns="0" lIns="0" rIns="0" tIns="0" wrap="none"/>
           <a:p>
             <a:r>
-              <a:rPr lang="de-CH"/>
+              <a:rPr lang="en-US"/>
               <a:t>&lt;header&gt;</a:t>
             </a:r>
             <a:endParaRPr/>
@@ -116,7 +116,7 @@
           <a:p>
             <a:pPr algn="r"/>
             <a:r>
-              <a:rPr lang="de-CH"/>
+              <a:rPr lang="en-US"/>
               <a:t>&lt;date/time&gt;</a:t>
             </a:r>
             <a:endParaRPr/>
@@ -146,7 +146,7 @@
           <a:bodyPr anchor="b" bIns="0" lIns="0" rIns="0" tIns="0" wrap="none"/>
           <a:p>
             <a:r>
-              <a:rPr lang="de-CH"/>
+              <a:rPr lang="en-US"/>
               <a:t>&lt;footer&gt;</a:t>
             </a:r>
             <a:endParaRPr/>
@@ -176,8 +176,8 @@
           <a:bodyPr anchor="b" bIns="0" lIns="0" rIns="0" tIns="0" wrap="none"/>
           <a:p>
             <a:pPr algn="r"/>
-            <a:fld id="{21E1F191-5191-41B1-A131-21C111A1A171}" type="slidenum">
-              <a:rPr lang="de-CH"/>
+            <a:fld id="{D151C1A1-91A1-41C1-B171-4121017101D1}" type="slidenum">
+              <a:rPr lang="en-US"/>
               <a:t>&lt;number&gt;</a:t>
             </a:fld>
             <a:endParaRPr/>
@@ -229,8 +229,8 @@
       </p:sp>
       <p:sp>
         <p:nvSpPr>
-          <p:cNvPr id="21" name="TextShape 2"/>
-          <p:cNvSpPr txBox="1"/>
+          <p:cNvPr id="21" name="CustomShape 2"/>
+          <p:cNvSpPr/>
           <p:nvPr/>
         </p:nvSpPr>
         <p:spPr>
@@ -245,8 +245,8 @@
         <p:txBody>
           <a:bodyPr bIns="45000" lIns="90000" rIns="90000" tIns="45000"/>
           <a:p>
-            <a:fld id="{E1F1A171-81C1-41B1-81D1-B121A171A1C1}" type="slidenum">
-              <a:rPr lang="de-CH" sz="2500">
+            <a:fld id="{D151F1B1-91D1-41D1-A1F1-714161F1C1D1}" type="slidenum">
+              <a:rPr lang="en-US" sz="2500">
                 <a:solidFill>
                   <a:srgbClr val="000000"/>
                 </a:solidFill>
@@ -319,7 +319,7 @@
         <p:spPr>
           <a:xfrm>
             <a:off x="0" y="20523240"/>
-            <a:ext cx="30279600" cy="1271160"/>
+            <a:ext cx="30279240" cy="1270800"/>
           </a:xfrm>
           <a:prstGeom prst="rect">
             <a:avLst/>
@@ -338,7 +338,7 @@
         <p:spPr>
           <a:xfrm>
             <a:off x="0" y="0"/>
-            <a:ext cx="30279600" cy="2033280"/>
+            <a:ext cx="30279240" cy="2032920"/>
           </a:xfrm>
           <a:prstGeom prst="rect">
             <a:avLst/>
@@ -363,7 +363,7 @@
         <p:spPr>
           <a:xfrm>
             <a:off x="11858760" y="700200"/>
-            <a:ext cx="8145000" cy="812520"/>
+            <a:ext cx="8144640" cy="812160"/>
           </a:xfrm>
           <a:prstGeom prst="rect">
             <a:avLst/>
@@ -392,8 +392,9 @@
         <p:txBody>
           <a:bodyPr anchor="ctr" bIns="0" lIns="0" rIns="0" tIns="0" wrap="none"/>
           <a:p>
-            <a:r>
-              <a:rPr lang="de-DE"/>
+            <a:pPr algn="ctr"/>
+            <a:r>
+              <a:rPr lang="en-US"/>
               <a:t>Click to edit the title text format</a:t>
             </a:r>
             <a:endParaRPr/>
@@ -428,7 +429,7 @@
               <a:buChar char=""/>
             </a:pPr>
             <a:r>
-              <a:rPr lang="de-DE"/>
+              <a:rPr lang="en-US"/>
               <a:t>Click to edit the outline text format</a:t>
             </a:r>
             <a:endParaRPr/>
@@ -440,7 +441,7 @@
               <a:buChar char=""/>
             </a:pPr>
             <a:r>
-              <a:rPr lang="de-DE"/>
+              <a:rPr lang="en-US"/>
               <a:t>Second Outline Level</a:t>
             </a:r>
             <a:endParaRPr/>
@@ -452,7 +453,7 @@
               <a:buChar char=""/>
             </a:pPr>
             <a:r>
-              <a:rPr lang="de-DE"/>
+              <a:rPr lang="en-US"/>
               <a:t>Third Outline Level</a:t>
             </a:r>
             <a:endParaRPr/>
@@ -464,7 +465,7 @@
               <a:buChar char=""/>
             </a:pPr>
             <a:r>
-              <a:rPr lang="de-DE"/>
+              <a:rPr lang="en-US"/>
               <a:t>Fourth Outline Level</a:t>
             </a:r>
             <a:endParaRPr/>
@@ -476,7 +477,7 @@
               <a:buChar char=""/>
             </a:pPr>
             <a:r>
-              <a:rPr lang="de-DE"/>
+              <a:rPr lang="en-US"/>
               <a:t>Fifth Outline Level</a:t>
             </a:r>
             <a:endParaRPr/>
@@ -488,7 +489,7 @@
               <a:buChar char=""/>
             </a:pPr>
             <a:r>
-              <a:rPr lang="de-DE"/>
+              <a:rPr lang="en-US"/>
               <a:t>Sixth Outline Level</a:t>
             </a:r>
             <a:endParaRPr/>
@@ -500,7 +501,7 @@
               <a:buChar char=""/>
             </a:pPr>
             <a:r>
-              <a:rPr lang="de-DE"/>
+              <a:rPr lang="en-US"/>
               <a:t>Seventh Outline Level</a:t>
             </a:r>
             <a:endParaRPr/>
@@ -512,7 +513,7 @@
               <a:buChar char=""/>
             </a:pPr>
             <a:r>
-              <a:rPr lang="de-DE"/>
+              <a:rPr lang="en-US"/>
               <a:t>Eighth Outline Level</a:t>
             </a:r>
             <a:endParaRPr/>
@@ -524,7 +525,7 @@
               <a:buChar char=""/>
             </a:pPr>
             <a:r>
-              <a:rPr lang="de-DE"/>
+              <a:rPr lang="en-US"/>
               <a:t>Ninth Outline Level</a:t>
             </a:r>
             <a:endParaRPr/>
@@ -566,17 +567,17 @@
         <p:spPr>
           <a:xfrm>
             <a:off x="936000" y="2448000"/>
-            <a:ext cx="27796680" cy="853560"/>
+            <a:ext cx="27796320" cy="853200"/>
           </a:xfrm>
           <a:prstGeom prst="rect">
             <a:avLst/>
           </a:prstGeom>
         </p:spPr>
         <p:txBody>
-          <a:bodyPr/>
-          <a:p>
-            <a:r>
-              <a:rPr b="1" lang="de-CH" sz="5000">
+          <a:bodyPr bIns="45000" lIns="90000" rIns="90000" tIns="45000"/>
+          <a:p>
+            <a:r>
+              <a:rPr b="1" lang="en-US" sz="5000">
                 <a:solidFill>
                   <a:srgbClr val="e20019"/>
                 </a:solidFill>
@@ -585,7 +586,7 @@
               <a:t>LISA – </a:t>
             </a:r>
             <a:r>
-              <a:rPr b="1" i="1" lang="de-CH" sz="5000">
+              <a:rPr b="1" i="1" lang="en-US" sz="5000">
                 <a:solidFill>
                   <a:srgbClr val="e20019"/>
                 </a:solidFill>
@@ -594,7 +595,7 @@
               <a:t>L</a:t>
             </a:r>
             <a:r>
-              <a:rPr b="1" lang="de-CH" sz="5000">
+              <a:rPr b="1" lang="en-US" sz="5000">
                 <a:solidFill>
                   <a:srgbClr val="e20019"/>
                 </a:solidFill>
@@ -603,7 +604,7 @@
               <a:t>ISA </a:t>
             </a:r>
             <a:r>
-              <a:rPr b="1" i="1" lang="de-CH" sz="5000">
+              <a:rPr b="1" i="1" lang="en-US" sz="5000">
                 <a:solidFill>
                   <a:srgbClr val="e20019"/>
                 </a:solidFill>
@@ -612,7 +613,7 @@
               <a:t>i</a:t>
             </a:r>
             <a:r>
-              <a:rPr b="1" lang="de-CH" sz="5000">
+              <a:rPr b="1" lang="en-US" sz="5000">
                 <a:solidFill>
                   <a:srgbClr val="e20019"/>
                 </a:solidFill>
@@ -621,7 +622,7 @@
               <a:t>ncludes </a:t>
             </a:r>
             <a:r>
-              <a:rPr b="1" i="1" lang="de-CH" sz="5000">
+              <a:rPr b="1" i="1" lang="en-US" sz="5000">
                 <a:solidFill>
                   <a:srgbClr val="e20019"/>
                 </a:solidFill>
@@ -630,7 +631,7 @@
               <a:t>S</a:t>
             </a:r>
             <a:r>
-              <a:rPr b="1" lang="de-CH" sz="5000">
+              <a:rPr b="1" lang="en-US" sz="5000">
                 <a:solidFill>
                   <a:srgbClr val="e20019"/>
                 </a:solidFill>
@@ -639,7 +640,7 @@
               <a:t>ubcl</a:t>
             </a:r>
             <a:r>
-              <a:rPr b="1" i="1" lang="de-CH" sz="5000">
+              <a:rPr b="1" i="1" lang="en-US" sz="5000">
                 <a:solidFill>
                   <a:srgbClr val="e20019"/>
                 </a:solidFill>
@@ -648,7 +649,7 @@
               <a:t>a</a:t>
             </a:r>
             <a:r>
-              <a:rPr b="1" lang="de-CH" sz="5000">
+              <a:rPr b="1" lang="en-US" sz="5000">
                 <a:solidFill>
                   <a:srgbClr val="e20019"/>
                 </a:solidFill>
@@ -669,18 +670,18 @@
         <p:spPr>
           <a:xfrm>
             <a:off x="936000" y="3456000"/>
-            <a:ext cx="27796680" cy="2716200"/>
+            <a:ext cx="27796320" cy="2715840"/>
           </a:xfrm>
           <a:prstGeom prst="rect">
             <a:avLst/>
           </a:prstGeom>
         </p:spPr>
         <p:txBody>
-          <a:bodyPr/>
+          <a:bodyPr bIns="45000" lIns="90000" rIns="90000" tIns="45000"/>
           <a:p>
             <a:pPr algn="just"/>
             <a:r>
-              <a:rPr b="1" lang="de-CH" sz="4000">
+              <a:rPr b="1" lang="en-US" sz="4000">
                 <a:solidFill>
                   <a:srgbClr val="000000"/>
                 </a:solidFill>
@@ -689,7 +690,7 @@
               <a:t>LISA ist eine objektorientierte Programmiersprache, welche von Grund auf selbst entwickelt wurde. Sie ist statisch typisiert und syntaktisch an Scala und Java angelehnt. Der Fokus liegt auf dem innovativen Typensystem und nicht auf einer umfangreichen Programmiersprache, um gezielt das Konzept von </a:t>
             </a:r>
             <a:r>
-              <a:rPr b="1" i="1" lang="de-CH" sz="4000">
+              <a:rPr b="1" i="1" lang="en-US" sz="4000">
                 <a:solidFill>
                   <a:srgbClr val="000000"/>
                 </a:solidFill>
@@ -698,7 +699,7 @@
               <a:t>Subclassing</a:t>
             </a:r>
             <a:r>
-              <a:rPr b="1" lang="de-CH" sz="4000">
+              <a:rPr b="1" lang="en-US" sz="4000">
                 <a:solidFill>
                   <a:srgbClr val="000000"/>
                 </a:solidFill>
@@ -719,7 +720,7 @@
         <p:spPr>
           <a:xfrm>
             <a:off x="11858040" y="20766240"/>
-            <a:ext cx="3665160" cy="467640"/>
+            <a:ext cx="3664800" cy="467280"/>
           </a:xfrm>
           <a:prstGeom prst="rect">
             <a:avLst/>
@@ -729,7 +730,7 @@
           <a:bodyPr bIns="43200" lIns="86400" rIns="86400" tIns="43200" wrap="none"/>
           <a:p>
             <a:r>
-              <a:rPr b="1" lang="de-CH" sz="2500">
+              <a:rPr b="1" lang="en-US" sz="2500">
                 <a:solidFill>
                   <a:srgbClr val="ffffff"/>
                 </a:solidFill>
@@ -750,7 +751,7 @@
         <p:spPr>
           <a:xfrm>
             <a:off x="630360" y="20689920"/>
-            <a:ext cx="5606640" cy="677160"/>
+            <a:ext cx="5606280" cy="676800"/>
           </a:xfrm>
           <a:prstGeom prst="rect">
             <a:avLst/>
@@ -760,7 +761,7 @@
           <a:bodyPr bIns="147960" lIns="296280" rIns="296280" tIns="147960"/>
           <a:p>
             <a:r>
-              <a:rPr lang="de-CH" sz="2500">
+              <a:rPr lang="en-US" sz="2500">
                 <a:solidFill>
                   <a:srgbClr val="ffffff"/>
                 </a:solidFill>
@@ -781,7 +782,7 @@
         <p:spPr>
           <a:xfrm>
             <a:off x="22328280" y="20423520"/>
-            <a:ext cx="7951320" cy="1058040"/>
+            <a:ext cx="7950960" cy="1057680"/>
           </a:xfrm>
           <a:prstGeom prst="rect">
             <a:avLst/>
@@ -790,46 +791,39 @@
         <p:txBody>
           <a:bodyPr bIns="147960" lIns="296280" rIns="296280" tIns="147960"/>
           <a:p>
+            <a:r>
+              <a:rPr lang="en-US" sz="2500">
+                <a:solidFill>
+                  <a:srgbClr val="ffffff"/>
+                </a:solidFill>
+                <a:latin typeface="Arial"/>
+              </a:rPr>
+              <a:t>Student: </a:t>
+            </a:r>
+            <a:r>
+              <a:rPr b="1" lang="en-US" sz="2500">
+                <a:solidFill>
+                  <a:srgbClr val="ffffff"/>
+                </a:solidFill>
+                <a:latin typeface="Arial"/>
+              </a:rPr>
+              <a:t>Ruben Bär und Stefan Heinemann</a:t>
+            </a:r>
+            <a:endParaRPr/>
+          </a:p>
+          <a:p>
             <a:pPr algn="r"/>
             <a:r>
-              <a:rPr lang="de-CH" sz="2500">
+              <a:rPr lang="en-US" sz="2500">
                 <a:solidFill>
                   <a:srgbClr val="ffffff"/>
                 </a:solidFill>
                 <a:latin typeface="Arial"/>
               </a:rPr>
-              <a:t>Student: </a:t>
-            </a:r>
-            <a:r>
-              <a:rPr b="1" lang="de-CH" sz="2500">
-                <a:solidFill>
-                  <a:srgbClr val="ffffff"/>
-                </a:solidFill>
-                <a:latin typeface="Arial"/>
-              </a:rPr>
-              <a:t>Ruben Bär und Stefan Heinemann</a:t>
-            </a:r>
-            <a:r>
-              <a:rPr lang="de-CH" sz="2500">
-                <a:solidFill>
-                  <a:srgbClr val="ffffff"/>
-                </a:solidFill>
-                <a:latin typeface="Arial"/>
-              </a:rPr>
-              <a:t>
-</a:t>
-            </a:r>
-            <a:r>
-              <a:rPr lang="de-CH" sz="2500">
-                <a:solidFill>
-                  <a:srgbClr val="ffffff"/>
-                </a:solidFill>
-                <a:latin typeface="Arial"/>
-              </a:rPr>
               <a:t>Professor: </a:t>
             </a:r>
             <a:r>
-              <a:rPr b="1" lang="de-CH" sz="2500">
+              <a:rPr b="1" lang="en-US" sz="2500">
                 <a:solidFill>
                   <a:srgbClr val="ffffff"/>
                 </a:solidFill>
@@ -850,27 +844,27 @@
         <p:spPr>
           <a:xfrm>
             <a:off x="14630400" y="6199200"/>
-            <a:ext cx="13694040" cy="8091360"/>
+            <a:ext cx="13693680" cy="8091000"/>
           </a:xfrm>
           <a:prstGeom prst="rect">
             <a:avLst/>
           </a:prstGeom>
         </p:spPr>
         <p:txBody>
-          <a:bodyPr/>
+          <a:bodyPr bIns="45000" lIns="90000" rIns="90000" tIns="45000"/>
           <a:p>
             <a:pPr algn="just"/>
             <a:r>
-              <a:rPr lang="de-CH" sz="4000">
-                <a:solidFill>
-                  <a:srgbClr val="000000"/>
-                </a:solidFill>
-                <a:latin typeface="Arial"/>
-              </a:rPr>
-              <a:t>andererseits teilweise das Kompilieren von sinnvollem Quellcode bezüglich der Wiederverwendbarkeit unterbindet. Als Beispiel soll die </a:t>
-            </a:r>
-            <a:r>
-              <a:rPr i="1" lang="de-CH" sz="4000">
+              <a:rPr lang="en-US" sz="4000">
+                <a:solidFill>
+                  <a:srgbClr val="000000"/>
+                </a:solidFill>
+                <a:latin typeface="Arial"/>
+              </a:rPr>
+              <a:t>aber teilweise auch das Kompilieren von sinnvollem Quellcode bezüglich der Wiederverwendbarkeit unterbindet. Als Beispiel soll die </a:t>
+            </a:r>
+            <a:r>
+              <a:rPr i="1" lang="en-US" sz="4000">
                 <a:solidFill>
                   <a:srgbClr val="000000"/>
                 </a:solidFill>
@@ -879,7 +873,7 @@
               <a:t>equals</a:t>
             </a:r>
             <a:r>
-              <a:rPr lang="de-CH" sz="4000">
+              <a:rPr lang="en-US" sz="4000">
                 <a:solidFill>
                   <a:srgbClr val="000000"/>
                 </a:solidFill>
@@ -888,7 +882,7 @@
               <a:t> Methode der Klasse </a:t>
             </a:r>
             <a:r>
-              <a:rPr i="1" lang="de-CH" sz="4000">
+              <a:rPr i="1" lang="en-US" sz="4000">
                 <a:solidFill>
                   <a:srgbClr val="000000"/>
                 </a:solidFill>
@@ -897,7 +891,7 @@
               <a:t>Object</a:t>
             </a:r>
             <a:r>
-              <a:rPr lang="de-CH" sz="4000">
+              <a:rPr lang="en-US" sz="4000">
                 <a:solidFill>
                   <a:srgbClr val="000000"/>
                 </a:solidFill>
@@ -906,7 +900,7 @@
               <a:t> in Java betrachtet werden. Wird diese Methode in Klassen, welche immer </a:t>
             </a:r>
             <a:r>
-              <a:rPr i="1" lang="de-CH" sz="4000">
+              <a:rPr i="1" lang="en-US" sz="4000">
                 <a:solidFill>
                   <a:srgbClr val="000000"/>
                 </a:solidFill>
@@ -915,7 +909,7 @@
               <a:t>Object</a:t>
             </a:r>
             <a:r>
-              <a:rPr lang="de-CH" sz="4000">
+              <a:rPr lang="en-US" sz="4000">
                 <a:solidFill>
                   <a:srgbClr val="000000"/>
                 </a:solidFill>
@@ -924,7 +918,7 @@
               <a:t> als Supertyp haben, weiter spezialisiert, ist die Verwendung von typunsicheren Anweisungen, wie zum Beispiel </a:t>
             </a:r>
             <a:r>
-              <a:rPr i="1" lang="de-CH" sz="4000">
+              <a:rPr i="1" lang="en-US" sz="4000">
                 <a:solidFill>
                   <a:srgbClr val="000000"/>
                 </a:solidFill>
@@ -933,7 +927,7 @@
               <a:t>Casts</a:t>
             </a:r>
             <a:r>
-              <a:rPr lang="de-CH" sz="4000">
+              <a:rPr lang="en-US" sz="4000">
                 <a:solidFill>
                   <a:srgbClr val="000000"/>
                 </a:solidFill>
@@ -946,7 +940,7 @@
           <a:p>
             <a:pPr algn="just"/>
             <a:r>
-              <a:rPr lang="de-CH" sz="4000">
+              <a:rPr lang="en-US" sz="4000">
                 <a:solidFill>
                   <a:srgbClr val="000000"/>
                 </a:solidFill>
@@ -955,7 +949,7 @@
               <a:t>Ähnliche Probleme können zwar mit </a:t>
             </a:r>
             <a:r>
-              <a:rPr i="1" lang="de-CH" sz="4000">
+              <a:rPr i="1" lang="en-US" sz="4000">
                 <a:solidFill>
                   <a:srgbClr val="000000"/>
                 </a:solidFill>
@@ -964,7 +958,7 @@
               <a:t>Generics</a:t>
             </a:r>
             <a:r>
-              <a:rPr lang="de-CH" sz="4000">
+              <a:rPr lang="en-US" sz="4000">
                 <a:solidFill>
                   <a:srgbClr val="000000"/>
                 </a:solidFill>
@@ -973,7 +967,7 @@
               <a:t> gelöst werden, jedoch stösst dieses Modell bei Typen, welche sich selbst als Methodenparameter erwarten, wie es bei </a:t>
             </a:r>
             <a:r>
-              <a:rPr i="1" lang="de-CH" sz="4000">
+              <a:rPr i="1" lang="en-US" sz="4000">
                 <a:solidFill>
                   <a:srgbClr val="000000"/>
                 </a:solidFill>
@@ -982,7 +976,7 @@
               <a:t>Object</a:t>
             </a:r>
             <a:r>
-              <a:rPr lang="de-CH" sz="4000">
+              <a:rPr lang="en-US" sz="4000">
                 <a:solidFill>
                   <a:srgbClr val="000000"/>
                 </a:solidFill>
@@ -991,7 +985,7 @@
               <a:t> der Fall ist, an seine Grenzen. Eine direkte Erweiterung von </a:t>
             </a:r>
             <a:r>
-              <a:rPr i="1" lang="de-CH" sz="4000">
+              <a:rPr i="1" lang="en-US" sz="4000">
                 <a:solidFill>
                   <a:srgbClr val="000000"/>
                 </a:solidFill>
@@ -1000,7 +994,7 @@
               <a:t>Generics</a:t>
             </a:r>
             <a:r>
-              <a:rPr lang="de-CH" sz="4000">
+              <a:rPr lang="en-US" sz="4000">
                 <a:solidFill>
                   <a:srgbClr val="000000"/>
                 </a:solidFill>
@@ -1009,7 +1003,7 @@
               <a:t> ist das </a:t>
             </a:r>
             <a:r>
-              <a:rPr i="1" lang="de-CH" sz="4000">
+              <a:rPr i="1" lang="en-US" sz="4000">
                 <a:solidFill>
                   <a:srgbClr val="000000"/>
                 </a:solidFill>
@@ -1018,7 +1012,7 @@
               <a:t>Subclassing</a:t>
             </a:r>
             <a:r>
-              <a:rPr lang="de-CH" sz="4000">
+              <a:rPr lang="en-US" sz="4000">
                 <a:solidFill>
                   <a:srgbClr val="000000"/>
                 </a:solidFill>
@@ -1039,18 +1033,18 @@
         <p:spPr>
           <a:xfrm>
             <a:off x="936720" y="6199200"/>
-            <a:ext cx="13465080" cy="8015040"/>
+            <a:ext cx="13464720" cy="8014680"/>
           </a:xfrm>
           <a:prstGeom prst="rect">
             <a:avLst/>
           </a:prstGeom>
         </p:spPr>
         <p:txBody>
-          <a:bodyPr/>
+          <a:bodyPr bIns="45000" lIns="90000" rIns="90000" tIns="45000"/>
           <a:p>
             <a:pPr algn="just"/>
             <a:r>
-              <a:rPr lang="de-CH" sz="4000">
+              <a:rPr lang="en-US" sz="4000">
                 <a:solidFill>
                   <a:srgbClr val="000000"/>
                 </a:solidFill>
@@ -1059,7 +1053,7 @@
               <a:t>Statisch typisierte Programmiersprachen und das Konzept des objektorientierten Programmierens konnten sich in vielen Bereichen der Softwareentwicklung etablieren. Entsprechend viele Sprachen und Modelle wurden entwickelt, um Software wiederverwendbar und wartbar zu machen. Einige dieser Modelle, wie zum Beispiel </a:t>
             </a:r>
             <a:r>
-              <a:rPr i="1" lang="de-CH" sz="4000">
+              <a:rPr i="1" lang="en-US" sz="4000">
                 <a:solidFill>
                   <a:srgbClr val="000000"/>
                 </a:solidFill>
@@ -1068,7 +1062,7 @@
               <a:t>Generics</a:t>
             </a:r>
             <a:r>
-              <a:rPr lang="de-CH" sz="4000">
+              <a:rPr lang="en-US" sz="4000">
                 <a:solidFill>
                   <a:srgbClr val="000000"/>
                 </a:solidFill>
@@ -1077,7 +1071,7 @@
               <a:t> oder </a:t>
             </a:r>
             <a:r>
-              <a:rPr i="1" lang="de-CH" sz="4000">
+              <a:rPr i="1" lang="en-US" sz="4000">
                 <a:solidFill>
                   <a:srgbClr val="000000"/>
                 </a:solidFill>
@@ -1086,28 +1080,31 @@
               <a:t>Polymorphie</a:t>
             </a:r>
             <a:r>
-              <a:rPr lang="de-CH" sz="4000">
-                <a:solidFill>
-                  <a:srgbClr val="000000"/>
-                </a:solidFill>
-                <a:latin typeface="Arial"/>
-              </a:rPr>
-              <a:t>, wurden in weit verbreitete Sprachen wie Java oder C# integriert. Zwar verbessern diese Modelle die Wiederverwendbarkeit von Softwarekomponenten, jedoch lösen sie nicht gewisse Schwierigkeiten, welche im Entwicklungsalltag auftreten. Dies betrifft insbesondere das Typensystem, weil dieses einerseits das Auftreten von gewissen Laufzeitausnahmen verhindert aber auch </a:t>
-            </a:r>
+              <a:rPr lang="en-US" sz="4000">
+                <a:solidFill>
+                  <a:srgbClr val="000000"/>
+                </a:solidFill>
+                <a:latin typeface="Arial"/>
+              </a:rPr>
+              <a:t>, wurden in weit verbreitete Sprachen wie Java oder C# integriert. Zwar verbessern diese Modelle die Wiederverwendbarkeit von Softwarekomponenten, jedoch lösen sie nicht gewisse Schwierigkeiten, welche im Entwicklungsalltag auftreten. Dies betrifft insbesondere das Typensystem, weil dieses einerseits das Auftreten von gewissen Laufzeitausnahmen verhindert, andererseits  </a:t>
+            </a:r>
+            <a:endParaRPr/>
+          </a:p>
+          <a:p>
             <a:endParaRPr/>
           </a:p>
         </p:txBody>
       </p:sp>
       <p:sp>
         <p:nvSpPr>
-          <p:cNvPr id="17" name="TextShape 8"/>
-          <p:cNvSpPr txBox="1"/>
+          <p:cNvPr id="17" name="CustomShape 8"/>
+          <p:cNvSpPr/>
           <p:nvPr/>
         </p:nvSpPr>
         <p:spPr>
           <a:xfrm>
             <a:off x="914400" y="14630400"/>
-            <a:ext cx="8686800" cy="5425200"/>
+            <a:ext cx="8686440" cy="5424840"/>
           </a:xfrm>
           <a:prstGeom prst="rect">
             <a:avLst/>
@@ -1117,61 +1114,73 @@
           <a:bodyPr bIns="45000" lIns="90000" rIns="90000" tIns="45000" wrap="none"/>
           <a:p>
             <a:r>
-              <a:rPr b="1" lang="de-CH" sz="2800">
+              <a:rPr b="1" lang="en-US" sz="2800">
                 <a:latin typeface="Monospace"/>
               </a:rPr>
               <a:t>class</a:t>
             </a:r>
             <a:r>
-              <a:rPr lang="de-CH" sz="2800"/>
+              <a:rPr lang="en-US" sz="2800">
+                <a:latin typeface="Monospace"/>
+              </a:rPr>
               <a:t> Animal { </a:t>
             </a:r>
             <a:endParaRPr/>
           </a:p>
           <a:p>
             <a:r>
-              <a:rPr lang="de-CH" sz="2800"/>
+              <a:rPr lang="en-US" sz="2800">
+                <a:latin typeface="Monospace"/>
+              </a:rPr>
               <a:t>  </a:t>
             </a:r>
             <a:r>
-              <a:rPr b="1" lang="de-CH" sz="2800">
+              <a:rPr b="1" lang="en-US" sz="2800">
                 <a:latin typeface="Monospace"/>
               </a:rPr>
               <a:t>def</a:t>
             </a:r>
             <a:r>
-              <a:rPr lang="de-CH" sz="2800"/>
+              <a:rPr lang="en-US" sz="2800">
+                <a:latin typeface="Monospace"/>
+              </a:rPr>
               <a:t> mate(other: </a:t>
             </a:r>
             <a:r>
-              <a:rPr b="1" lang="de-CH" sz="2800">
+              <a:rPr b="1" lang="en-US" sz="2800">
                 <a:latin typeface="Monospace"/>
               </a:rPr>
               <a:t>MyType</a:t>
             </a:r>
             <a:r>
-              <a:rPr lang="de-CH" sz="2800"/>
+              <a:rPr lang="en-US" sz="2800">
+                <a:latin typeface="Monospace"/>
+              </a:rPr>
               <a:t>): </a:t>
             </a:r>
             <a:r>
-              <a:rPr b="1" lang="de-CH" sz="2800">
+              <a:rPr b="1" lang="en-US" sz="2800">
                 <a:latin typeface="Monospace"/>
               </a:rPr>
               <a:t>MyType</a:t>
             </a:r>
             <a:r>
-              <a:rPr lang="de-CH" sz="2800"/>
+              <a:rPr lang="en-US" sz="2800">
+                <a:latin typeface="Monospace"/>
+              </a:rPr>
               <a:t> { </a:t>
             </a:r>
             <a:endParaRPr/>
           </a:p>
           <a:p>
             <a:r>
-              <a:rPr lang="de-CH" sz="2800"/>
+              <a:rPr lang="en-US" sz="2800">
+                <a:latin typeface="Monospace"/>
+              </a:rPr>
               <a:t>    </a:t>
             </a:r>
             <a:r>
-              <a:rPr i="1" lang="de-CH" sz="2800">
+              <a:rPr i="1" lang="en-US" sz="2800">
                 <a:solidFill>
                   <a:srgbClr val="666666"/>
                 </a:solidFill>
@@ -1183,18 +1192,33 @@
           </a:p>
           <a:p>
             <a:r>
-              <a:rPr lang="de-CH" sz="2800"/>
+              <a:rPr lang="en-US" sz="2800">
+                <a:solidFill>
+                  <a:srgbClr val="666666"/>
+                </a:solidFill>
+                <a:latin typeface="Monospace"/>
+              </a:rPr>
               <a:t>  </a:t>
             </a:r>
             <a:r>
-              <a:rPr lang="de-CH" sz="2800"/>
+              <a:rPr lang="en-US" sz="2800">
+                <a:solidFill>
+                  <a:srgbClr val="666666"/>
+                </a:solidFill>
+                <a:latin typeface="Monospace"/>
+              </a:rPr>
               <a:t>} </a:t>
             </a:r>
             <a:endParaRPr/>
           </a:p>
           <a:p>
             <a:r>
-              <a:rPr lang="de-CH" sz="2800"/>
+              <a:rPr lang="en-US" sz="2800">
+                <a:solidFill>
+                  <a:srgbClr val="666666"/>
+                </a:solidFill>
+                <a:latin typeface="Monospace"/>
+              </a:rPr>
               <a:t>} </a:t>
             </a:r>
             <a:endParaRPr/>
@@ -1204,89 +1228,159 @@
           </a:p>
           <a:p>
             <a:r>
-              <a:rPr b="1" lang="de-CH" sz="2800">
+              <a:rPr b="1" lang="en-US" sz="2800">
+                <a:solidFill>
+                  <a:srgbClr val="666666"/>
+                </a:solidFill>
                 <a:latin typeface="Monospace"/>
               </a:rPr>
               <a:t>class</a:t>
             </a:r>
             <a:r>
-              <a:rPr lang="de-CH" sz="2800"/>
+              <a:rPr lang="en-US" sz="2800">
+                <a:solidFill>
+                  <a:srgbClr val="666666"/>
+                </a:solidFill>
+                <a:latin typeface="Monospace"/>
+              </a:rPr>
               <a:t> Dog </a:t>
             </a:r>
             <a:r>
-              <a:rPr b="1" lang="de-CH" sz="2800">
+              <a:rPr b="1" lang="en-US" sz="2800">
+                <a:solidFill>
+                  <a:srgbClr val="666666"/>
+                </a:solidFill>
                 <a:latin typeface="Monospace"/>
               </a:rPr>
               <a:t>subclassOf</a:t>
             </a:r>
             <a:r>
-              <a:rPr lang="de-CH" sz="2800"/>
+              <a:rPr lang="en-US" sz="2800">
+                <a:solidFill>
+                  <a:srgbClr val="666666"/>
+                </a:solidFill>
+                <a:latin typeface="Monospace"/>
+              </a:rPr>
               <a:t> Animal { </a:t>
             </a:r>
             <a:endParaRPr/>
           </a:p>
           <a:p>
             <a:r>
-              <a:rPr lang="de-CH" sz="2800"/>
+              <a:rPr lang="en-US" sz="2800">
+                <a:solidFill>
+                  <a:srgbClr val="666666"/>
+                </a:solidFill>
+                <a:latin typeface="Monospace"/>
+              </a:rPr>
               <a:t>  </a:t>
             </a:r>
             <a:r>
-              <a:rPr b="1" lang="de-CH" sz="2800">
+              <a:rPr b="1" lang="en-US" sz="2800">
+                <a:solidFill>
+                  <a:srgbClr val="666666"/>
+                </a:solidFill>
                 <a:latin typeface="Monospace"/>
               </a:rPr>
               <a:t>def</a:t>
             </a:r>
             <a:r>
-              <a:rPr lang="de-CH" sz="2800"/>
+              <a:rPr lang="en-US" sz="2800">
+                <a:solidFill>
+                  <a:srgbClr val="666666"/>
+                </a:solidFill>
+                <a:latin typeface="Monospace"/>
+              </a:rPr>
               <a:t> mate(other: </a:t>
             </a:r>
             <a:r>
-              <a:rPr b="1" lang="de-CH" sz="2800">
+              <a:rPr b="1" lang="en-US" sz="2800">
+                <a:solidFill>
+                  <a:srgbClr val="666666"/>
+                </a:solidFill>
                 <a:latin typeface="Monospace"/>
               </a:rPr>
               <a:t>MyType):</a:t>
             </a:r>
             <a:r>
-              <a:rPr lang="de-CH" sz="2800"/>
+              <a:rPr lang="en-US" sz="2800">
+                <a:solidFill>
+                  <a:srgbClr val="666666"/>
+                </a:solidFill>
+                <a:latin typeface="Monospace"/>
+              </a:rPr>
               <a:t> </a:t>
             </a:r>
             <a:r>
-              <a:rPr b="1" lang="de-CH" sz="2800">
+              <a:rPr b="1" lang="en-US" sz="2800">
+                <a:solidFill>
+                  <a:srgbClr val="666666"/>
+                </a:solidFill>
                 <a:latin typeface="Monospace"/>
               </a:rPr>
               <a:t>MyType</a:t>
             </a:r>
             <a:r>
-              <a:rPr lang="de-CH" sz="2800"/>
+              <a:rPr lang="en-US" sz="2800">
+                <a:solidFill>
+                  <a:srgbClr val="666666"/>
+                </a:solidFill>
+                <a:latin typeface="Monospace"/>
+              </a:rPr>
               <a:t> { </a:t>
             </a:r>
             <a:endParaRPr/>
           </a:p>
           <a:p>
             <a:r>
-              <a:rPr lang="de-CH" sz="2800"/>
+              <a:rPr lang="en-US" sz="2800">
+                <a:solidFill>
+                  <a:srgbClr val="666666"/>
+                </a:solidFill>
+                <a:latin typeface="Monospace"/>
+              </a:rPr>
               <a:t>    </a:t>
             </a:r>
             <a:r>
-              <a:rPr lang="de-CH" sz="2800"/>
+              <a:rPr lang="en-US" sz="2800">
+                <a:solidFill>
+                  <a:srgbClr val="666666"/>
+                </a:solidFill>
+                <a:latin typeface="Monospace"/>
+              </a:rPr>
               <a:t>// Specialising the argument 'other' </a:t>
             </a:r>
             <a:endParaRPr/>
           </a:p>
           <a:p>
             <a:r>
-              <a:rPr lang="de-CH" sz="2800"/>
+              <a:rPr lang="en-US" sz="2800">
+                <a:solidFill>
+                  <a:srgbClr val="666666"/>
+                </a:solidFill>
+                <a:latin typeface="Monospace"/>
+              </a:rPr>
               <a:t>  </a:t>
             </a:r>
             <a:r>
-              <a:rPr lang="de-CH" sz="2800"/>
+              <a:rPr lang="en-US" sz="2800">
+                <a:solidFill>
+                  <a:srgbClr val="666666"/>
+                </a:solidFill>
+                <a:latin typeface="Monospace"/>
+              </a:rPr>
               <a:t>} </a:t>
             </a:r>
             <a:endParaRPr/>
           </a:p>
           <a:p>
             <a:r>
-              <a:rPr lang="de-CH" sz="2800"/>
+              <a:rPr lang="en-US" sz="2800">
+                <a:solidFill>
+                  <a:srgbClr val="666666"/>
+                </a:solidFill>
+                <a:latin typeface="Monospace"/>
+              </a:rPr>
               <a:t>} </a:t>
             </a:r>
             <a:endParaRPr/>
@@ -1295,14 +1389,14 @@
       </p:sp>
       <p:sp>
         <p:nvSpPr>
-          <p:cNvPr id="18" name="TextShape 9"/>
-          <p:cNvSpPr txBox="1"/>
+          <p:cNvPr id="18" name="CustomShape 9"/>
+          <p:cNvSpPr/>
           <p:nvPr/>
         </p:nvSpPr>
         <p:spPr>
           <a:xfrm>
             <a:off x="9590400" y="14631120"/>
-            <a:ext cx="8928720" cy="5028840"/>
+            <a:ext cx="8928360" cy="5028480"/>
           </a:xfrm>
           <a:prstGeom prst="rect">
             <a:avLst/>
@@ -1312,89 +1406,111 @@
           <a:bodyPr bIns="45000" lIns="90000" rIns="90000" tIns="45000" wrap="none"/>
           <a:p>
             <a:r>
-              <a:rPr b="1" lang="de-CH" sz="2800">
+              <a:rPr b="1" lang="en-US" sz="2800">
                 <a:latin typeface="Monospace"/>
               </a:rPr>
               <a:t>class</a:t>
             </a:r>
             <a:r>
-              <a:rPr lang="de-CH" sz="2800"/>
+              <a:rPr lang="en-US" sz="2800">
+                <a:latin typeface="Monospace"/>
+              </a:rPr>
               <a:t> Cat </a:t>
             </a:r>
             <a:r>
-              <a:rPr b="1" lang="de-CH" sz="2800">
+              <a:rPr b="1" lang="en-US" sz="2800">
                 <a:latin typeface="Monospace"/>
               </a:rPr>
               <a:t>subclassOf</a:t>
             </a:r>
             <a:r>
-              <a:rPr lang="de-CH" sz="2800"/>
+              <a:rPr lang="en-US" sz="2800">
+                <a:latin typeface="Monospace"/>
+              </a:rPr>
               <a:t> Animal { </a:t>
             </a:r>
             <a:endParaRPr/>
           </a:p>
           <a:p>
             <a:r>
-              <a:rPr lang="de-CH" sz="2800"/>
+              <a:rPr lang="en-US" sz="2800">
+                <a:latin typeface="Monospace"/>
+              </a:rPr>
               <a:t>  </a:t>
             </a:r>
             <a:r>
-              <a:rPr b="1" lang="de-CH" sz="2800">
+              <a:rPr b="1" lang="en-US" sz="2800">
                 <a:latin typeface="Monospace"/>
               </a:rPr>
               <a:t>def</a:t>
             </a:r>
             <a:r>
-              <a:rPr lang="de-CH" sz="2800"/>
+              <a:rPr lang="en-US" sz="2800">
+                <a:latin typeface="Monospace"/>
+              </a:rPr>
               <a:t> mate(other: </a:t>
             </a:r>
             <a:r>
-              <a:rPr b="1" lang="de-CH" sz="2800">
+              <a:rPr b="1" lang="en-US" sz="2800">
                 <a:latin typeface="Monospace"/>
               </a:rPr>
               <a:t>MyType):</a:t>
             </a:r>
             <a:r>
-              <a:rPr lang="de-CH" sz="2800"/>
+              <a:rPr lang="en-US" sz="2800">
+                <a:latin typeface="Monospace"/>
+              </a:rPr>
               <a:t> </a:t>
             </a:r>
             <a:r>
-              <a:rPr b="1" lang="de-CH" sz="2800">
+              <a:rPr b="1" lang="en-US" sz="2800">
                 <a:latin typeface="Monospace"/>
               </a:rPr>
               <a:t>MyType</a:t>
             </a:r>
             <a:r>
-              <a:rPr lang="de-CH" sz="2800"/>
+              <a:rPr lang="en-US" sz="2800">
+                <a:latin typeface="Monospace"/>
+              </a:rPr>
               <a:t> { </a:t>
             </a:r>
             <a:endParaRPr/>
           </a:p>
           <a:p>
             <a:r>
-              <a:rPr lang="de-CH" sz="2800"/>
+              <a:rPr lang="en-US" sz="2800">
+                <a:latin typeface="Monospace"/>
+              </a:rPr>
               <a:t>    </a:t>
             </a:r>
             <a:r>
-              <a:rPr lang="de-CH" sz="2800"/>
+              <a:rPr lang="en-US" sz="2800">
+                <a:latin typeface="Monospace"/>
+              </a:rPr>
               <a:t>// Specialising the argument 'other' </a:t>
             </a:r>
             <a:endParaRPr/>
           </a:p>
           <a:p>
             <a:r>
-              <a:rPr lang="de-CH" sz="2800"/>
+              <a:rPr lang="en-US" sz="2800">
+                <a:latin typeface="Monospace"/>
+              </a:rPr>
               <a:t>  </a:t>
             </a:r>
             <a:r>
-              <a:rPr lang="de-CH" sz="2800"/>
+              <a:rPr lang="en-US" sz="2800">
+                <a:latin typeface="Monospace"/>
+              </a:rPr>
               <a:t>} </a:t>
             </a:r>
             <a:endParaRPr/>
           </a:p>
           <a:p>
             <a:r>
-              <a:rPr lang="de-CH" sz="2800"/>
+              <a:rPr lang="en-US" sz="2800">
+                <a:latin typeface="Monospace"/>
+              </a:rPr>
               <a:t>} </a:t>
             </a:r>
             <a:endParaRPr/>
@@ -1404,106 +1520,132 @@
           </a:p>
           <a:p>
             <a:r>
-              <a:rPr b="1" lang="de-CH" sz="2800">
+              <a:rPr b="1" lang="en-US" sz="2800">
                 <a:latin typeface="Monospace"/>
               </a:rPr>
               <a:t>class</a:t>
             </a:r>
             <a:r>
-              <a:rPr lang="de-CH" sz="2800"/>
+              <a:rPr lang="en-US" sz="2800">
+                <a:latin typeface="Monospace"/>
+              </a:rPr>
               <a:t> Persian </a:t>
             </a:r>
             <a:r>
-              <a:rPr b="1" lang="de-CH" sz="2800">
+              <a:rPr b="1" lang="en-US" sz="2800">
                 <a:latin typeface="Monospace"/>
               </a:rPr>
               <a:t>subtypeOf</a:t>
             </a:r>
             <a:r>
-              <a:rPr lang="de-CH" sz="2800"/>
+              <a:rPr lang="en-US" sz="2800">
+                <a:latin typeface="Monospace"/>
+              </a:rPr>
               <a:t> Cat { </a:t>
             </a:r>
             <a:endParaRPr/>
           </a:p>
           <a:p>
             <a:r>
-              <a:rPr lang="de-CH" sz="2800"/>
+              <a:rPr lang="en-US" sz="2800">
+                <a:latin typeface="Monospace"/>
+              </a:rPr>
               <a:t>  </a:t>
             </a:r>
             <a:r>
-              <a:rPr b="1" lang="de-CH" sz="2800">
+              <a:rPr b="1" lang="en-US" sz="2800">
                 <a:latin typeface="Monospace"/>
               </a:rPr>
               <a:t>var</a:t>
             </a:r>
             <a:r>
-              <a:rPr lang="de-CH" sz="2800"/>
+              <a:rPr lang="en-US" sz="2800">
+                <a:latin typeface="Monospace"/>
+              </a:rPr>
               <a:t> needsGrooming: Bool; </a:t>
             </a:r>
             <a:endParaRPr/>
           </a:p>
           <a:p>
             <a:r>
-              <a:rPr lang="de-CH" sz="2800"/>
+              <a:rPr lang="en-US" sz="2800">
+                <a:latin typeface="Monospace"/>
+              </a:rPr>
               <a:t>  </a:t>
             </a:r>
             <a:r>
-              <a:rPr b="1" lang="de-CH" sz="2800">
+              <a:rPr b="1" lang="en-US" sz="2800">
                 <a:latin typeface="Monospace"/>
               </a:rPr>
               <a:t>def</a:t>
             </a:r>
             <a:r>
-              <a:rPr lang="de-CH" sz="2800"/>
+              <a:rPr lang="en-US" sz="2800">
+                <a:latin typeface="Monospace"/>
+              </a:rPr>
               <a:t> mate(other: </a:t>
             </a:r>
             <a:r>
-              <a:rPr b="1" lang="de-CH" sz="2800">
+              <a:rPr b="1" lang="en-US" sz="2800">
                 <a:latin typeface="Monospace"/>
               </a:rPr>
               <a:t>MyType):</a:t>
             </a:r>
             <a:r>
-              <a:rPr lang="de-CH" sz="2800"/>
+              <a:rPr lang="en-US" sz="2800">
+                <a:latin typeface="Monospace"/>
+              </a:rPr>
               <a:t> </a:t>
             </a:r>
             <a:r>
-              <a:rPr b="1" lang="de-CH" sz="2800">
+              <a:rPr b="1" lang="en-US" sz="2800">
                 <a:latin typeface="Monospace"/>
               </a:rPr>
               <a:t>MyType</a:t>
             </a:r>
             <a:r>
-              <a:rPr lang="de-CH" sz="2800"/>
+              <a:rPr lang="en-US" sz="2800">
+                <a:latin typeface="Monospace"/>
+              </a:rPr>
               <a:t> { </a:t>
             </a:r>
             <a:endParaRPr/>
           </a:p>
           <a:p>
             <a:r>
-              <a:rPr lang="de-CH" sz="2800"/>
+              <a:rPr lang="en-US" sz="2800">
+                <a:latin typeface="Monospace"/>
+              </a:rPr>
               <a:t>    </a:t>
             </a:r>
             <a:r>
-              <a:rPr lang="de-CH" sz="2800"/>
+              <a:rPr lang="en-US" sz="2800">
+                <a:latin typeface="Monospace"/>
+              </a:rPr>
               <a:t>// Persian can mate other Cats </a:t>
             </a:r>
             <a:endParaRPr/>
           </a:p>
           <a:p>
             <a:r>
-              <a:rPr lang="de-CH" sz="2800"/>
+              <a:rPr lang="en-US" sz="2800">
+                <a:latin typeface="Monospace"/>
+              </a:rPr>
               <a:t>  </a:t>
             </a:r>
             <a:r>
-              <a:rPr lang="de-CH" sz="2800"/>
+              <a:rPr lang="en-US" sz="2800">
+                <a:latin typeface="Monospace"/>
+              </a:rPr>
               <a:t>} </a:t>
             </a:r>
             <a:endParaRPr/>
           </a:p>
           <a:p>
             <a:r>
-              <a:rPr lang="de-CH" sz="2800"/>
+              <a:rPr lang="en-US" sz="2800">
+                <a:latin typeface="Monospace"/>
+              </a:rPr>
               <a:t>}</a:t>
             </a:r>
             <a:endParaRPr/>
@@ -1519,27 +1661,27 @@
         <p:spPr>
           <a:xfrm>
             <a:off x="18745200" y="14211000"/>
-            <a:ext cx="9579600" cy="4510800"/>
+            <a:ext cx="9579240" cy="4510440"/>
           </a:xfrm>
           <a:prstGeom prst="rect">
             <a:avLst/>
           </a:prstGeom>
         </p:spPr>
         <p:txBody>
-          <a:bodyPr/>
+          <a:bodyPr bIns="45000" lIns="90000" rIns="90000" tIns="45000"/>
           <a:p>
             <a:pPr algn="just"/>
             <a:r>
-              <a:rPr lang="de-CH" sz="4000">
-                <a:solidFill>
-                  <a:srgbClr val="000000"/>
-                </a:solidFill>
-                <a:latin typeface="Arial"/>
-              </a:rPr>
-              <a:t>vom eigenen Typ implizit umsetzt. LISA versucht das Modell vom </a:t>
-            </a:r>
-            <a:r>
-              <a:rPr i="1" lang="de-CH" sz="4000">
+              <a:rPr lang="en-US" sz="4000">
+                <a:solidFill>
+                  <a:srgbClr val="000000"/>
+                </a:solidFill>
+                <a:latin typeface="Arial"/>
+              </a:rPr>
+              <a:t>vom </a:t>
+            </a:r>
+            <a:r>
+              <a:rPr i="1" lang="en-US" sz="4000">
                 <a:solidFill>
                   <a:srgbClr val="000000"/>
                 </a:solidFill>
@@ -1548,7 +1690,7 @@
               <a:t>Subtyping</a:t>
             </a:r>
             <a:r>
-              <a:rPr lang="de-CH" sz="4000">
+              <a:rPr lang="en-US" sz="4000">
                 <a:solidFill>
                   <a:srgbClr val="000000"/>
                 </a:solidFill>
@@ -1557,7 +1699,7 @@
               <a:t> sowie das vom </a:t>
             </a:r>
             <a:r>
-              <a:rPr i="1" lang="de-CH" sz="4000">
+              <a:rPr i="1" lang="en-US" sz="4000">
                 <a:solidFill>
                   <a:srgbClr val="000000"/>
                 </a:solidFill>
@@ -1566,7 +1708,7 @@
               <a:t>Subclassing</a:t>
             </a:r>
             <a:r>
-              <a:rPr lang="de-CH" sz="4000">
+              <a:rPr lang="en-US" sz="4000">
                 <a:solidFill>
                   <a:srgbClr val="000000"/>
                 </a:solidFill>
@@ -1582,7 +1724,7 @@
           <a:p>
             <a:pPr algn="just"/>
             <a:r>
-              <a:rPr lang="de-CH" sz="4000">
+              <a:rPr lang="en-US" sz="4000">
                 <a:solidFill>
                   <a:srgbClr val="000000"/>
                 </a:solidFill>

</xml_diff>